<commit_message>
Updates from Class feedback
</commit_message>
<xml_diff>
--- a/The Ultimate Blinkin Light.pptx
+++ b/The Ultimate Blinkin Light.pptx
@@ -5,44 +5,43 @@
     <p:sldMasterId id="2147483678" r:id="rId1"/>
   </p:sldMasterIdLst>
   <p:notesMasterIdLst>
-    <p:notesMasterId r:id="rId37"/>
+    <p:notesMasterId r:id="rId36"/>
   </p:notesMasterIdLst>
   <p:sldIdLst>
     <p:sldId id="256" r:id="rId2"/>
     <p:sldId id="257" r:id="rId3"/>
-    <p:sldId id="258" r:id="rId4"/>
-    <p:sldId id="259" r:id="rId5"/>
-    <p:sldId id="260" r:id="rId6"/>
-    <p:sldId id="267" r:id="rId7"/>
-    <p:sldId id="287" r:id="rId8"/>
-    <p:sldId id="261" r:id="rId9"/>
+    <p:sldId id="259" r:id="rId4"/>
+    <p:sldId id="260" r:id="rId5"/>
+    <p:sldId id="267" r:id="rId6"/>
+    <p:sldId id="287" r:id="rId7"/>
+    <p:sldId id="261" r:id="rId8"/>
+    <p:sldId id="265" r:id="rId9"/>
     <p:sldId id="288" r:id="rId10"/>
     <p:sldId id="268" r:id="rId11"/>
     <p:sldId id="262" r:id="rId12"/>
     <p:sldId id="263" r:id="rId13"/>
     <p:sldId id="275" r:id="rId14"/>
-    <p:sldId id="265" r:id="rId15"/>
-    <p:sldId id="285" r:id="rId16"/>
-    <p:sldId id="284" r:id="rId17"/>
-    <p:sldId id="286" r:id="rId18"/>
-    <p:sldId id="283" r:id="rId19"/>
-    <p:sldId id="289" r:id="rId20"/>
-    <p:sldId id="291" r:id="rId21"/>
-    <p:sldId id="276" r:id="rId22"/>
-    <p:sldId id="277" r:id="rId23"/>
-    <p:sldId id="278" r:id="rId24"/>
-    <p:sldId id="279" r:id="rId25"/>
-    <p:sldId id="280" r:id="rId26"/>
-    <p:sldId id="281" r:id="rId27"/>
-    <p:sldId id="292" r:id="rId28"/>
-    <p:sldId id="290" r:id="rId29"/>
-    <p:sldId id="293" r:id="rId30"/>
-    <p:sldId id="294" r:id="rId31"/>
-    <p:sldId id="295" r:id="rId32"/>
-    <p:sldId id="296" r:id="rId33"/>
-    <p:sldId id="298" r:id="rId34"/>
-    <p:sldId id="297" r:id="rId35"/>
-    <p:sldId id="299" r:id="rId36"/>
+    <p:sldId id="285" r:id="rId15"/>
+    <p:sldId id="284" r:id="rId16"/>
+    <p:sldId id="286" r:id="rId17"/>
+    <p:sldId id="283" r:id="rId18"/>
+    <p:sldId id="289" r:id="rId19"/>
+    <p:sldId id="291" r:id="rId20"/>
+    <p:sldId id="276" r:id="rId21"/>
+    <p:sldId id="277" r:id="rId22"/>
+    <p:sldId id="278" r:id="rId23"/>
+    <p:sldId id="279" r:id="rId24"/>
+    <p:sldId id="280" r:id="rId25"/>
+    <p:sldId id="281" r:id="rId26"/>
+    <p:sldId id="292" r:id="rId27"/>
+    <p:sldId id="290" r:id="rId28"/>
+    <p:sldId id="293" r:id="rId29"/>
+    <p:sldId id="294" r:id="rId30"/>
+    <p:sldId id="295" r:id="rId31"/>
+    <p:sldId id="296" r:id="rId32"/>
+    <p:sldId id="298" r:id="rId33"/>
+    <p:sldId id="297" r:id="rId34"/>
+    <p:sldId id="299" r:id="rId35"/>
   </p:sldIdLst>
   <p:sldSz cx="12192000" cy="6858000"/>
   <p:notesSz cx="6858000" cy="9144000"/>
@@ -3773,7 +3772,7 @@
           <a:p>
             <a:fld id="{14B92294-0834-44CF-8476-05CABBADC869}" type="datetimeFigureOut">
               <a:rPr lang="en-US" smtClean="0"/>
-              <a:t>5/21/2020</a:t>
+              <a:t>6/6/2020</a:t>
             </a:fld>
             <a:endParaRPr lang="en-US"/>
           </a:p>
@@ -4114,7 +4113,7 @@
           <a:p>
             <a:fld id="{6F7C3E71-58C6-4663-AB85-A0F436AFD0C1}" type="slidenum">
               <a:rPr lang="en-US" smtClean="0"/>
-              <a:t>29</a:t>
+              <a:t>28</a:t>
             </a:fld>
             <a:endParaRPr lang="en-US"/>
           </a:p>
@@ -8415,7 +8414,7 @@
           <a:p>
             <a:fld id="{2742C387-02E0-4745-93F3-3F71F0A605CC}" type="datetimeFigureOut">
               <a:rPr lang="en-US" smtClean="0"/>
-              <a:t>5/21/2020</a:t>
+              <a:t>6/6/2020</a:t>
             </a:fld>
             <a:endParaRPr lang="en-US"/>
           </a:p>
@@ -8682,7 +8681,7 @@
           <a:p>
             <a:fld id="{2742C387-02E0-4745-93F3-3F71F0A605CC}" type="datetimeFigureOut">
               <a:rPr lang="en-US" smtClean="0"/>
-              <a:t>5/21/2020</a:t>
+              <a:t>6/6/2020</a:t>
             </a:fld>
             <a:endParaRPr lang="en-US"/>
           </a:p>
@@ -8878,7 +8877,7 @@
           <a:p>
             <a:fld id="{2742C387-02E0-4745-93F3-3F71F0A605CC}" type="datetimeFigureOut">
               <a:rPr lang="en-US" smtClean="0"/>
-              <a:t>5/21/2020</a:t>
+              <a:t>6/6/2020</a:t>
             </a:fld>
             <a:endParaRPr lang="en-US"/>
           </a:p>
@@ -9141,7 +9140,7 @@
           <a:p>
             <a:fld id="{2742C387-02E0-4745-93F3-3F71F0A605CC}" type="datetimeFigureOut">
               <a:rPr lang="en-US" smtClean="0"/>
-              <a:t>5/21/2020</a:t>
+              <a:t>6/6/2020</a:t>
             </a:fld>
             <a:endParaRPr lang="en-US"/>
           </a:p>
@@ -9575,7 +9574,7 @@
           <a:p>
             <a:fld id="{2742C387-02E0-4745-93F3-3F71F0A605CC}" type="datetimeFigureOut">
               <a:rPr lang="en-US" smtClean="0"/>
-              <a:t>5/21/2020</a:t>
+              <a:t>6/6/2020</a:t>
             </a:fld>
             <a:endParaRPr lang="en-US"/>
           </a:p>
@@ -10121,7 +10120,7 @@
           <a:p>
             <a:fld id="{2742C387-02E0-4745-93F3-3F71F0A605CC}" type="datetimeFigureOut">
               <a:rPr lang="en-US" smtClean="0"/>
-              <a:t>5/21/2020</a:t>
+              <a:t>6/6/2020</a:t>
             </a:fld>
             <a:endParaRPr lang="en-US"/>
           </a:p>
@@ -10841,7 +10840,7 @@
           <a:p>
             <a:fld id="{2742C387-02E0-4745-93F3-3F71F0A605CC}" type="datetimeFigureOut">
               <a:rPr lang="en-US" smtClean="0"/>
-              <a:t>5/21/2020</a:t>
+              <a:t>6/6/2020</a:t>
             </a:fld>
             <a:endParaRPr lang="en-US"/>
           </a:p>
@@ -11011,7 +11010,7 @@
           <a:p>
             <a:fld id="{2742C387-02E0-4745-93F3-3F71F0A605CC}" type="datetimeFigureOut">
               <a:rPr lang="en-US" smtClean="0"/>
-              <a:t>5/21/2020</a:t>
+              <a:t>6/6/2020</a:t>
             </a:fld>
             <a:endParaRPr lang="en-US"/>
           </a:p>
@@ -11191,7 +11190,7 @@
           <a:p>
             <a:fld id="{2742C387-02E0-4745-93F3-3F71F0A605CC}" type="datetimeFigureOut">
               <a:rPr lang="en-US" smtClean="0"/>
-              <a:t>5/21/2020</a:t>
+              <a:t>6/6/2020</a:t>
             </a:fld>
             <a:endParaRPr lang="en-US"/>
           </a:p>
@@ -11361,7 +11360,7 @@
           <a:p>
             <a:fld id="{2742C387-02E0-4745-93F3-3F71F0A605CC}" type="datetimeFigureOut">
               <a:rPr lang="en-US" smtClean="0"/>
-              <a:t>5/21/2020</a:t>
+              <a:t>6/6/2020</a:t>
             </a:fld>
             <a:endParaRPr lang="en-US"/>
           </a:p>
@@ -11611,7 +11610,7 @@
           <a:p>
             <a:fld id="{2742C387-02E0-4745-93F3-3F71F0A605CC}" type="datetimeFigureOut">
               <a:rPr lang="en-US" smtClean="0"/>
-              <a:t>5/21/2020</a:t>
+              <a:t>6/6/2020</a:t>
             </a:fld>
             <a:endParaRPr lang="en-US"/>
           </a:p>
@@ -11843,7 +11842,7 @@
           <a:p>
             <a:fld id="{2742C387-02E0-4745-93F3-3F71F0A605CC}" type="datetimeFigureOut">
               <a:rPr lang="en-US" smtClean="0"/>
-              <a:t>5/21/2020</a:t>
+              <a:t>6/6/2020</a:t>
             </a:fld>
             <a:endParaRPr lang="en-US"/>
           </a:p>
@@ -12224,7 +12223,7 @@
           <a:p>
             <a:fld id="{2742C387-02E0-4745-93F3-3F71F0A605CC}" type="datetimeFigureOut">
               <a:rPr lang="en-US" smtClean="0"/>
-              <a:t>5/21/2020</a:t>
+              <a:t>6/6/2020</a:t>
             </a:fld>
             <a:endParaRPr lang="en-US"/>
           </a:p>
@@ -12342,7 +12341,7 @@
           <a:p>
             <a:fld id="{2742C387-02E0-4745-93F3-3F71F0A605CC}" type="datetimeFigureOut">
               <a:rPr lang="en-US" smtClean="0"/>
-              <a:t>5/21/2020</a:t>
+              <a:t>6/6/2020</a:t>
             </a:fld>
             <a:endParaRPr lang="en-US"/>
           </a:p>
@@ -12437,7 +12436,7 @@
           <a:p>
             <a:fld id="{2742C387-02E0-4745-93F3-3F71F0A605CC}" type="datetimeFigureOut">
               <a:rPr lang="en-US" smtClean="0"/>
-              <a:t>5/21/2020</a:t>
+              <a:t>6/6/2020</a:t>
             </a:fld>
             <a:endParaRPr lang="en-US"/>
           </a:p>
@@ -12686,7 +12685,7 @@
           <a:p>
             <a:fld id="{2742C387-02E0-4745-93F3-3F71F0A605CC}" type="datetimeFigureOut">
               <a:rPr lang="en-US" smtClean="0"/>
-              <a:t>5/21/2020</a:t>
+              <a:t>6/6/2020</a:t>
             </a:fld>
             <a:endParaRPr lang="en-US"/>
           </a:p>
@@ -12966,7 +12965,7 @@
           <a:p>
             <a:fld id="{2742C387-02E0-4745-93F3-3F71F0A605CC}" type="datetimeFigureOut">
               <a:rPr lang="en-US" smtClean="0"/>
-              <a:t>5/21/2020</a:t>
+              <a:t>6/6/2020</a:t>
             </a:fld>
             <a:endParaRPr lang="en-US"/>
           </a:p>
@@ -16033,7 +16032,7 @@
           <a:p>
             <a:fld id="{2742C387-02E0-4745-93F3-3F71F0A605CC}" type="datetimeFigureOut">
               <a:rPr lang="en-US" smtClean="0"/>
-              <a:t>5/21/2020</a:t>
+              <a:t>6/6/2020</a:t>
             </a:fld>
             <a:endParaRPr lang="en-US"/>
           </a:p>
@@ -17116,130 +17115,6 @@
 <file path=ppt/slides/slide14.xml><?xml version="1.0" encoding="utf-8"?>
 <p:sld xmlns:a="http://schemas.openxmlformats.org/drawingml/2006/main" xmlns:r="http://schemas.openxmlformats.org/officeDocument/2006/relationships" xmlns:p="http://schemas.openxmlformats.org/presentationml/2006/main">
   <p:cSld>
-    <p:spTree>
-      <p:nvGrpSpPr>
-        <p:cNvPr id="1" name=""/>
-        <p:cNvGrpSpPr/>
-        <p:nvPr/>
-      </p:nvGrpSpPr>
-      <p:grpSpPr>
-        <a:xfrm>
-          <a:off x="0" y="0"/>
-          <a:ext cx="0" cy="0"/>
-          <a:chOff x="0" y="0"/>
-          <a:chExt cx="0" cy="0"/>
-        </a:xfrm>
-      </p:grpSpPr>
-      <p:pic>
-        <p:nvPicPr>
-          <p:cNvPr id="5" name="Picture 4"/>
-          <p:cNvPicPr>
-            <a:picLocks noChangeAspect="1"/>
-          </p:cNvPicPr>
-          <p:nvPr/>
-        </p:nvPicPr>
-        <p:blipFill>
-          <a:blip r:embed="rId2"/>
-          <a:stretch>
-            <a:fillRect/>
-          </a:stretch>
-        </p:blipFill>
-        <p:spPr>
-          <a:xfrm>
-            <a:off x="873392" y="951722"/>
-            <a:ext cx="5139294" cy="4946570"/>
-          </a:xfrm>
-          <a:prstGeom prst="rect">
-            <a:avLst/>
-          </a:prstGeom>
-        </p:spPr>
-      </p:pic>
-      <p:sp>
-        <p:nvSpPr>
-          <p:cNvPr id="2" name="Title 1"/>
-          <p:cNvSpPr>
-            <a:spLocks noGrp="1"/>
-          </p:cNvSpPr>
-          <p:nvPr>
-            <p:ph type="title"/>
-          </p:nvPr>
-        </p:nvSpPr>
-        <p:spPr>
-          <a:xfrm>
-            <a:off x="6569957" y="618518"/>
-            <a:ext cx="4747088" cy="1478570"/>
-          </a:xfrm>
-        </p:spPr>
-        <p:txBody>
-          <a:bodyPr>
-            <a:normAutofit/>
-          </a:bodyPr>
-          <a:lstStyle/>
-          <a:p>
-            <a:r>
-              <a:rPr lang="en-US" dirty="0"/>
-              <a:t>The Breadboard</a:t>
-            </a:r>
-          </a:p>
-        </p:txBody>
-      </p:sp>
-      <p:sp>
-        <p:nvSpPr>
-          <p:cNvPr id="3" name="Content Placeholder 2"/>
-          <p:cNvSpPr>
-            <a:spLocks noGrp="1"/>
-          </p:cNvSpPr>
-          <p:nvPr>
-            <p:ph idx="1"/>
-          </p:nvPr>
-        </p:nvSpPr>
-        <p:spPr>
-          <a:xfrm>
-            <a:off x="6569957" y="2249487"/>
-            <a:ext cx="4747087" cy="3541714"/>
-          </a:xfrm>
-        </p:spPr>
-        <p:txBody>
-          <a:bodyPr>
-            <a:normAutofit/>
-          </a:bodyPr>
-          <a:lstStyle/>
-          <a:p>
-            <a:r>
-              <a:rPr lang="en-US" dirty="0"/>
-              <a:t>The power lines, 2 on each edge, run vertically</a:t>
-            </a:r>
-          </a:p>
-          <a:p>
-            <a:r>
-              <a:rPr lang="en-US" dirty="0"/>
-              <a:t>The prototyping lines run horizontally</a:t>
-            </a:r>
-          </a:p>
-          <a:p>
-            <a:r>
-              <a:rPr lang="en-US" dirty="0"/>
-              <a:t>No lines cross the center gap</a:t>
-            </a:r>
-          </a:p>
-        </p:txBody>
-      </p:sp>
-    </p:spTree>
-    <p:extLst>
-      <p:ext uri="{BB962C8B-B14F-4D97-AF65-F5344CB8AC3E}">
-        <p14:creationId xmlns:p14="http://schemas.microsoft.com/office/powerpoint/2010/main" val="2671499571"/>
-      </p:ext>
-    </p:extLst>
-  </p:cSld>
-  <p:clrMapOvr>
-    <a:masterClrMapping/>
-  </p:clrMapOvr>
-</p:sld>
-</file>
-
-<file path=ppt/slides/slide15.xml><?xml version="1.0" encoding="utf-8"?>
-<p:sld xmlns:a="http://schemas.openxmlformats.org/drawingml/2006/main" xmlns:r="http://schemas.openxmlformats.org/officeDocument/2006/relationships" xmlns:p="http://schemas.openxmlformats.org/presentationml/2006/main">
-  <p:cSld>
     <p:bg>
       <p:bgPr>
         <a:blipFill>
@@ -17435,7 +17310,7 @@
 </p:sld>
 </file>
 
-<file path=ppt/slides/slide16.xml><?xml version="1.0" encoding="utf-8"?>
+<file path=ppt/slides/slide15.xml><?xml version="1.0" encoding="utf-8"?>
 <p:sld xmlns:a="http://schemas.openxmlformats.org/drawingml/2006/main" xmlns:r="http://schemas.openxmlformats.org/officeDocument/2006/relationships" xmlns:p="http://schemas.openxmlformats.org/presentationml/2006/main">
   <p:cSld>
     <p:spTree>
@@ -17546,7 +17421,7 @@
 </p:sld>
 </file>
 
-<file path=ppt/slides/slide17.xml><?xml version="1.0" encoding="utf-8"?>
+<file path=ppt/slides/slide16.xml><?xml version="1.0" encoding="utf-8"?>
 <p:sld xmlns:a="http://schemas.openxmlformats.org/drawingml/2006/main" xmlns:r="http://schemas.openxmlformats.org/officeDocument/2006/relationships" xmlns:p="http://schemas.openxmlformats.org/presentationml/2006/main">
   <p:cSld>
     <p:spTree>
@@ -17658,7 +17533,7 @@
 </p:sld>
 </file>
 
-<file path=ppt/slides/slide18.xml><?xml version="1.0" encoding="utf-8"?>
+<file path=ppt/slides/slide17.xml><?xml version="1.0" encoding="utf-8"?>
 <p:sld xmlns:a="http://schemas.openxmlformats.org/drawingml/2006/main" xmlns:r="http://schemas.openxmlformats.org/officeDocument/2006/relationships" xmlns:p="http://schemas.openxmlformats.org/presentationml/2006/main">
   <p:cSld>
     <p:spTree>
@@ -17746,7 +17621,7 @@
 </p:sld>
 </file>
 
-<file path=ppt/slides/slide19.xml><?xml version="1.0" encoding="utf-8"?>
+<file path=ppt/slides/slide18.xml><?xml version="1.0" encoding="utf-8"?>
 <p:sld xmlns:a="http://schemas.openxmlformats.org/drawingml/2006/main" xmlns:r="http://schemas.openxmlformats.org/officeDocument/2006/relationships" xmlns:p="http://schemas.openxmlformats.org/presentationml/2006/main">
   <p:cSld>
     <p:bg>
@@ -21343,114 +21218,7 @@
 </p:sld>
 </file>
 
-<file path=ppt/slides/slide2.xml><?xml version="1.0" encoding="utf-8"?>
-<p:sld xmlns:a="http://schemas.openxmlformats.org/drawingml/2006/main" xmlns:r="http://schemas.openxmlformats.org/officeDocument/2006/relationships" xmlns:p="http://schemas.openxmlformats.org/presentationml/2006/main">
-  <p:cSld>
-    <p:spTree>
-      <p:nvGrpSpPr>
-        <p:cNvPr id="1" name=""/>
-        <p:cNvGrpSpPr/>
-        <p:nvPr/>
-      </p:nvGrpSpPr>
-      <p:grpSpPr>
-        <a:xfrm>
-          <a:off x="0" y="0"/>
-          <a:ext cx="0" cy="0"/>
-          <a:chOff x="0" y="0"/>
-          <a:chExt cx="0" cy="0"/>
-        </a:xfrm>
-      </p:grpSpPr>
-      <p:sp>
-        <p:nvSpPr>
-          <p:cNvPr id="2" name="Title 1">
-            <a:extLst>
-              <a:ext uri="{FF2B5EF4-FFF2-40B4-BE49-F238E27FC236}">
-                <a16:creationId xmlns:a16="http://schemas.microsoft.com/office/drawing/2014/main" id="{DAE4AD03-093C-4FEF-96F1-53DC6F0DB4D0}"/>
-              </a:ext>
-            </a:extLst>
-          </p:cNvPr>
-          <p:cNvSpPr>
-            <a:spLocks noGrp="1"/>
-          </p:cNvSpPr>
-          <p:nvPr>
-            <p:ph type="title"/>
-          </p:nvPr>
-        </p:nvSpPr>
-        <p:spPr/>
-        <p:txBody>
-          <a:bodyPr/>
-          <a:lstStyle/>
-          <a:p>
-            <a:r>
-              <a:rPr lang="en-US" dirty="0"/>
-              <a:t>Marcel Chabot</a:t>
-            </a:r>
-          </a:p>
-        </p:txBody>
-      </p:sp>
-      <p:sp>
-        <p:nvSpPr>
-          <p:cNvPr id="3" name="Content Placeholder 2">
-            <a:extLst>
-              <a:ext uri="{FF2B5EF4-FFF2-40B4-BE49-F238E27FC236}">
-                <a16:creationId xmlns:a16="http://schemas.microsoft.com/office/drawing/2014/main" id="{21460603-DE2A-4087-82CA-31DDE2B7D8D1}"/>
-              </a:ext>
-            </a:extLst>
-          </p:cNvPr>
-          <p:cNvSpPr>
-            <a:spLocks noGrp="1"/>
-          </p:cNvSpPr>
-          <p:nvPr>
-            <p:ph idx="1"/>
-          </p:nvPr>
-        </p:nvSpPr>
-        <p:spPr/>
-        <p:txBody>
-          <a:bodyPr/>
-          <a:lstStyle/>
-          <a:p>
-            <a:r>
-              <a:rPr lang="en-US" dirty="0"/>
-              <a:t>Software Development Lead</a:t>
-            </a:r>
-          </a:p>
-          <a:p>
-            <a:r>
-              <a:rPr lang="en-US" dirty="0"/>
-              <a:t>Maker</a:t>
-            </a:r>
-          </a:p>
-          <a:p>
-            <a:r>
-              <a:rPr lang="en-US" dirty="0"/>
-              <a:t>Not a teacher</a:t>
-            </a:r>
-          </a:p>
-          <a:p>
-            <a:r>
-              <a:rPr lang="en-US" dirty="0"/>
-              <a:t>I’m a total geek and I’m proud of it</a:t>
-            </a:r>
-          </a:p>
-          <a:p>
-            <a:endParaRPr lang="en-US" dirty="0"/>
-          </a:p>
-        </p:txBody>
-      </p:sp>
-    </p:spTree>
-    <p:extLst>
-      <p:ext uri="{BB962C8B-B14F-4D97-AF65-F5344CB8AC3E}">
-        <p14:creationId xmlns:p14="http://schemas.microsoft.com/office/powerpoint/2010/main" val="2591935580"/>
-      </p:ext>
-    </p:extLst>
-  </p:cSld>
-  <p:clrMapOvr>
-    <a:masterClrMapping/>
-  </p:clrMapOvr>
-</p:sld>
-</file>
-
-<file path=ppt/slides/slide20.xml><?xml version="1.0" encoding="utf-8"?>
+<file path=ppt/slides/slide19.xml><?xml version="1.0" encoding="utf-8"?>
 <p:sld xmlns:a="http://schemas.openxmlformats.org/drawingml/2006/main" xmlns:r="http://schemas.openxmlformats.org/officeDocument/2006/relationships" xmlns:p="http://schemas.openxmlformats.org/presentationml/2006/main">
   <p:cSld>
     <p:bg>
@@ -26539,7 +26307,114 @@
 </p:sld>
 </file>
 
-<file path=ppt/slides/slide21.xml><?xml version="1.0" encoding="utf-8"?>
+<file path=ppt/slides/slide2.xml><?xml version="1.0" encoding="utf-8"?>
+<p:sld xmlns:a="http://schemas.openxmlformats.org/drawingml/2006/main" xmlns:r="http://schemas.openxmlformats.org/officeDocument/2006/relationships" xmlns:p="http://schemas.openxmlformats.org/presentationml/2006/main">
+  <p:cSld>
+    <p:spTree>
+      <p:nvGrpSpPr>
+        <p:cNvPr id="1" name=""/>
+        <p:cNvGrpSpPr/>
+        <p:nvPr/>
+      </p:nvGrpSpPr>
+      <p:grpSpPr>
+        <a:xfrm>
+          <a:off x="0" y="0"/>
+          <a:ext cx="0" cy="0"/>
+          <a:chOff x="0" y="0"/>
+          <a:chExt cx="0" cy="0"/>
+        </a:xfrm>
+      </p:grpSpPr>
+      <p:sp>
+        <p:nvSpPr>
+          <p:cNvPr id="2" name="Title 1">
+            <a:extLst>
+              <a:ext uri="{FF2B5EF4-FFF2-40B4-BE49-F238E27FC236}">
+                <a16:creationId xmlns:a16="http://schemas.microsoft.com/office/drawing/2014/main" id="{DAE4AD03-093C-4FEF-96F1-53DC6F0DB4D0}"/>
+              </a:ext>
+            </a:extLst>
+          </p:cNvPr>
+          <p:cNvSpPr>
+            <a:spLocks noGrp="1"/>
+          </p:cNvSpPr>
+          <p:nvPr>
+            <p:ph type="title"/>
+          </p:nvPr>
+        </p:nvSpPr>
+        <p:spPr/>
+        <p:txBody>
+          <a:bodyPr/>
+          <a:lstStyle/>
+          <a:p>
+            <a:r>
+              <a:rPr lang="en-US" dirty="0"/>
+              <a:t>Marcel Chabot</a:t>
+            </a:r>
+          </a:p>
+        </p:txBody>
+      </p:sp>
+      <p:sp>
+        <p:nvSpPr>
+          <p:cNvPr id="3" name="Content Placeholder 2">
+            <a:extLst>
+              <a:ext uri="{FF2B5EF4-FFF2-40B4-BE49-F238E27FC236}">
+                <a16:creationId xmlns:a16="http://schemas.microsoft.com/office/drawing/2014/main" id="{21460603-DE2A-4087-82CA-31DDE2B7D8D1}"/>
+              </a:ext>
+            </a:extLst>
+          </p:cNvPr>
+          <p:cNvSpPr>
+            <a:spLocks noGrp="1"/>
+          </p:cNvSpPr>
+          <p:nvPr>
+            <p:ph idx="1"/>
+          </p:nvPr>
+        </p:nvSpPr>
+        <p:spPr/>
+        <p:txBody>
+          <a:bodyPr/>
+          <a:lstStyle/>
+          <a:p>
+            <a:r>
+              <a:rPr lang="en-US" dirty="0"/>
+              <a:t>Software Development Lead</a:t>
+            </a:r>
+          </a:p>
+          <a:p>
+            <a:r>
+              <a:rPr lang="en-US" dirty="0"/>
+              <a:t>Maker</a:t>
+            </a:r>
+          </a:p>
+          <a:p>
+            <a:r>
+              <a:rPr lang="en-US" dirty="0"/>
+              <a:t>Not a teacher</a:t>
+            </a:r>
+          </a:p>
+          <a:p>
+            <a:r>
+              <a:rPr lang="en-US" dirty="0"/>
+              <a:t>I’m a total geek and I’m proud of it</a:t>
+            </a:r>
+          </a:p>
+          <a:p>
+            <a:endParaRPr lang="en-US" dirty="0"/>
+          </a:p>
+        </p:txBody>
+      </p:sp>
+    </p:spTree>
+    <p:extLst>
+      <p:ext uri="{BB962C8B-B14F-4D97-AF65-F5344CB8AC3E}">
+        <p14:creationId xmlns:p14="http://schemas.microsoft.com/office/powerpoint/2010/main" val="2591935580"/>
+      </p:ext>
+    </p:extLst>
+  </p:cSld>
+  <p:clrMapOvr>
+    <a:masterClrMapping/>
+  </p:clrMapOvr>
+</p:sld>
+</file>
+
+<file path=ppt/slides/slide20.xml><?xml version="1.0" encoding="utf-8"?>
 <p:sld xmlns:a="http://schemas.openxmlformats.org/drawingml/2006/main" xmlns:r="http://schemas.openxmlformats.org/officeDocument/2006/relationships" xmlns:p="http://schemas.openxmlformats.org/presentationml/2006/main">
   <p:cSld>
     <p:spTree>
@@ -26684,7 +26559,7 @@
 </p:sld>
 </file>
 
-<file path=ppt/slides/slide22.xml><?xml version="1.0" encoding="utf-8"?>
+<file path=ppt/slides/slide21.xml><?xml version="1.0" encoding="utf-8"?>
 <p:sld xmlns:a="http://schemas.openxmlformats.org/drawingml/2006/main" xmlns:r="http://schemas.openxmlformats.org/officeDocument/2006/relationships" xmlns:p="http://schemas.openxmlformats.org/presentationml/2006/main">
   <p:cSld>
     <p:spTree>
@@ -26967,7 +26842,7 @@
 </p:sld>
 </file>
 
-<file path=ppt/slides/slide23.xml><?xml version="1.0" encoding="utf-8"?>
+<file path=ppt/slides/slide22.xml><?xml version="1.0" encoding="utf-8"?>
 <p:sld xmlns:a="http://schemas.openxmlformats.org/drawingml/2006/main" xmlns:r="http://schemas.openxmlformats.org/officeDocument/2006/relationships" xmlns:p="http://schemas.openxmlformats.org/presentationml/2006/main">
   <p:cSld>
     <p:spTree>
@@ -27099,7 +26974,7 @@
 </p:sld>
 </file>
 
-<file path=ppt/slides/slide24.xml><?xml version="1.0" encoding="utf-8"?>
+<file path=ppt/slides/slide23.xml><?xml version="1.0" encoding="utf-8"?>
 <p:sld xmlns:a="http://schemas.openxmlformats.org/drawingml/2006/main" xmlns:r="http://schemas.openxmlformats.org/officeDocument/2006/relationships" xmlns:p="http://schemas.openxmlformats.org/presentationml/2006/main">
   <p:cSld>
     <p:spTree>
@@ -27175,7 +27050,7 @@
 </p:sld>
 </file>
 
-<file path=ppt/slides/slide25.xml><?xml version="1.0" encoding="utf-8"?>
+<file path=ppt/slides/slide24.xml><?xml version="1.0" encoding="utf-8"?>
 <p:sld xmlns:a="http://schemas.openxmlformats.org/drawingml/2006/main" xmlns:r="http://schemas.openxmlformats.org/officeDocument/2006/relationships" xmlns:p="http://schemas.openxmlformats.org/presentationml/2006/main">
   <p:cSld>
     <p:spTree>
@@ -27275,7 +27150,7 @@
 </p:sld>
 </file>
 
-<file path=ppt/slides/slide26.xml><?xml version="1.0" encoding="utf-8"?>
+<file path=ppt/slides/slide25.xml><?xml version="1.0" encoding="utf-8"?>
 <p:sld xmlns:a="http://schemas.openxmlformats.org/drawingml/2006/main" xmlns:r="http://schemas.openxmlformats.org/officeDocument/2006/relationships" xmlns:p="http://schemas.openxmlformats.org/presentationml/2006/main">
   <p:cSld>
     <p:spTree>
@@ -27351,7 +27226,7 @@
 </p:sld>
 </file>
 
-<file path=ppt/slides/slide27.xml><?xml version="1.0" encoding="utf-8"?>
+<file path=ppt/slides/slide26.xml><?xml version="1.0" encoding="utf-8"?>
 <p:sld xmlns:a="http://schemas.openxmlformats.org/drawingml/2006/main" xmlns:r="http://schemas.openxmlformats.org/officeDocument/2006/relationships" xmlns:p="http://schemas.openxmlformats.org/presentationml/2006/main">
   <p:cSld>
     <p:spTree>
@@ -27439,7 +27314,7 @@
 </p:sld>
 </file>
 
-<file path=ppt/slides/slide28.xml><?xml version="1.0" encoding="utf-8"?>
+<file path=ppt/slides/slide27.xml><?xml version="1.0" encoding="utf-8"?>
 <p:sld xmlns:a="http://schemas.openxmlformats.org/drawingml/2006/main" xmlns:r="http://schemas.openxmlformats.org/officeDocument/2006/relationships" xmlns:p="http://schemas.openxmlformats.org/presentationml/2006/main">
   <p:cSld>
     <p:spTree>
@@ -27533,7 +27408,7 @@
 </p:sld>
 </file>
 
-<file path=ppt/slides/slide29.xml><?xml version="1.0" encoding="utf-8"?>
+<file path=ppt/slides/slide28.xml><?xml version="1.0" encoding="utf-8"?>
 <p:sld xmlns:a="http://schemas.openxmlformats.org/drawingml/2006/main" xmlns:r="http://schemas.openxmlformats.org/officeDocument/2006/relationships" xmlns:p="http://schemas.openxmlformats.org/presentationml/2006/main">
   <p:cSld>
     <p:bg>
@@ -34678,361 +34553,7 @@
 </p:sld>
 </file>
 
-<file path=ppt/slides/slide3.xml><?xml version="1.0" encoding="utf-8"?>
-<p:sld xmlns:a="http://schemas.openxmlformats.org/drawingml/2006/main" xmlns:r="http://schemas.openxmlformats.org/officeDocument/2006/relationships" xmlns:p="http://schemas.openxmlformats.org/presentationml/2006/main">
-  <p:cSld>
-    <p:spTree>
-      <p:nvGrpSpPr>
-        <p:cNvPr id="1" name=""/>
-        <p:cNvGrpSpPr/>
-        <p:nvPr/>
-      </p:nvGrpSpPr>
-      <p:grpSpPr>
-        <a:xfrm>
-          <a:off x="0" y="0"/>
-          <a:ext cx="0" cy="0"/>
-          <a:chOff x="0" y="0"/>
-          <a:chExt cx="0" cy="0"/>
-        </a:xfrm>
-      </p:grpSpPr>
-      <p:sp>
-        <p:nvSpPr>
-          <p:cNvPr id="2" name="Title 1">
-            <a:extLst>
-              <a:ext uri="{FF2B5EF4-FFF2-40B4-BE49-F238E27FC236}">
-                <a16:creationId xmlns:a16="http://schemas.microsoft.com/office/drawing/2014/main" id="{FEA8BD2D-E0E3-4615-996C-C490C08818CD}"/>
-              </a:ext>
-            </a:extLst>
-          </p:cNvPr>
-          <p:cNvSpPr>
-            <a:spLocks noGrp="1"/>
-          </p:cNvSpPr>
-          <p:nvPr>
-            <p:ph type="title"/>
-          </p:nvPr>
-        </p:nvSpPr>
-        <p:spPr/>
-        <p:txBody>
-          <a:bodyPr/>
-          <a:lstStyle/>
-          <a:p>
-            <a:r>
-              <a:rPr lang="en-US" dirty="0"/>
-              <a:t>First online Programming Class</a:t>
-            </a:r>
-          </a:p>
-        </p:txBody>
-      </p:sp>
-      <p:sp>
-        <p:nvSpPr>
-          <p:cNvPr id="3" name="Content Placeholder 2">
-            <a:extLst>
-              <a:ext uri="{FF2B5EF4-FFF2-40B4-BE49-F238E27FC236}">
-                <a16:creationId xmlns:a16="http://schemas.microsoft.com/office/drawing/2014/main" id="{85C4CB20-C380-49ED-9F31-8D0A29BC5481}"/>
-              </a:ext>
-            </a:extLst>
-          </p:cNvPr>
-          <p:cNvSpPr>
-            <a:spLocks noGrp="1"/>
-          </p:cNvSpPr>
-          <p:nvPr>
-            <p:ph idx="1"/>
-          </p:nvPr>
-        </p:nvSpPr>
-        <p:spPr/>
-        <p:txBody>
-          <a:bodyPr/>
-          <a:lstStyle/>
-          <a:p>
-            <a:endParaRPr lang="en-US"/>
-          </a:p>
-        </p:txBody>
-      </p:sp>
-      <p:pic>
-        <p:nvPicPr>
-          <p:cNvPr id="4" name="Picture 6">
-            <a:extLst>
-              <a:ext uri="{FF2B5EF4-FFF2-40B4-BE49-F238E27FC236}">
-                <a16:creationId xmlns:a16="http://schemas.microsoft.com/office/drawing/2014/main" id="{77562A27-E85E-48AA-B1D9-2B98549B0ABB}"/>
-              </a:ext>
-            </a:extLst>
-          </p:cNvPr>
-          <p:cNvPicPr>
-            <a:picLocks noChangeAspect="1"/>
-          </p:cNvPicPr>
-          <p:nvPr/>
-        </p:nvPicPr>
-        <p:blipFill>
-          <a:blip r:embed="rId2"/>
-          <a:stretch>
-            <a:fillRect/>
-          </a:stretch>
-        </p:blipFill>
-        <p:spPr>
-          <a:xfrm>
-            <a:off x="1141411" y="2435834"/>
-            <a:ext cx="4689234" cy="3176956"/>
-          </a:xfrm>
-          <a:prstGeom prst="round2DiagRect">
-            <a:avLst>
-              <a:gd name="adj1" fmla="val 5608"/>
-              <a:gd name="adj2" fmla="val 0"/>
-            </a:avLst>
-          </a:prstGeom>
-          <a:ln w="19050" cap="sq">
-            <a:solidFill>
-              <a:schemeClr val="tx2">
-                <a:lumMod val="60000"/>
-                <a:lumOff val="40000"/>
-                <a:alpha val="60000"/>
-              </a:schemeClr>
-            </a:solidFill>
-            <a:miter lim="800000"/>
-          </a:ln>
-          <a:effectLst>
-            <a:outerShdw blurRad="88900" dist="38100" dir="5400000" algn="t" rotWithShape="0">
-              <a:prstClr val="black">
-                <a:alpha val="40000"/>
-              </a:prstClr>
-            </a:outerShdw>
-          </a:effectLst>
-        </p:spPr>
-      </p:pic>
-      <p:sp>
-        <p:nvSpPr>
-          <p:cNvPr id="5" name="Content Placeholder 5">
-            <a:extLst>
-              <a:ext uri="{FF2B5EF4-FFF2-40B4-BE49-F238E27FC236}">
-                <a16:creationId xmlns:a16="http://schemas.microsoft.com/office/drawing/2014/main" id="{BEE58004-0E5E-4A3F-8E04-4ADD49AAF1E0}"/>
-              </a:ext>
-            </a:extLst>
-          </p:cNvPr>
-          <p:cNvSpPr txBox="1">
-            <a:spLocks/>
-          </p:cNvSpPr>
-          <p:nvPr/>
-        </p:nvSpPr>
-        <p:spPr>
-          <a:xfrm>
-            <a:off x="6336727" y="2249487"/>
-            <a:ext cx="4710683" cy="3541714"/>
-          </a:xfrm>
-          <a:prstGeom prst="rect">
-            <a:avLst/>
-          </a:prstGeom>
-        </p:spPr>
-        <p:txBody>
-          <a:bodyPr vert="horz" lIns="91440" tIns="45720" rIns="91440" bIns="45720" rtlCol="0">
-            <a:normAutofit/>
-          </a:bodyPr>
-          <a:lstStyle>
-            <a:lvl1pPr marL="228600" indent="-228600" algn="l" defTabSz="914400" rtl="0" eaLnBrk="1" latinLnBrk="0" hangingPunct="1">
-              <a:lnSpc>
-                <a:spcPct val="120000"/>
-              </a:lnSpc>
-              <a:spcBef>
-                <a:spcPts val="1000"/>
-              </a:spcBef>
-              <a:buSzPct val="125000"/>
-              <a:buFont typeface="Arial" panose="020B0604020202020204" pitchFamily="34" charset="0"/>
-              <a:buChar char="•"/>
-              <a:defRPr sz="2400" kern="1200">
-                <a:solidFill>
-                  <a:schemeClr val="tx1"/>
-                </a:solidFill>
-                <a:latin typeface="+mn-lt"/>
-                <a:ea typeface="+mn-ea"/>
-                <a:cs typeface="+mn-cs"/>
-              </a:defRPr>
-            </a:lvl1pPr>
-            <a:lvl2pPr marL="685800" indent="-228600" algn="l" defTabSz="914400" rtl="0" eaLnBrk="1" latinLnBrk="0" hangingPunct="1">
-              <a:lnSpc>
-                <a:spcPct val="120000"/>
-              </a:lnSpc>
-              <a:spcBef>
-                <a:spcPts val="500"/>
-              </a:spcBef>
-              <a:buSzPct val="125000"/>
-              <a:buFont typeface="Arial" panose="020B0604020202020204" pitchFamily="34" charset="0"/>
-              <a:buChar char="•"/>
-              <a:defRPr sz="2000" kern="1200">
-                <a:solidFill>
-                  <a:schemeClr val="tx1"/>
-                </a:solidFill>
-                <a:latin typeface="+mn-lt"/>
-                <a:ea typeface="+mn-ea"/>
-                <a:cs typeface="+mn-cs"/>
-              </a:defRPr>
-            </a:lvl2pPr>
-            <a:lvl3pPr marL="1143000" indent="-228600" algn="l" defTabSz="914400" rtl="0" eaLnBrk="1" latinLnBrk="0" hangingPunct="1">
-              <a:lnSpc>
-                <a:spcPct val="120000"/>
-              </a:lnSpc>
-              <a:spcBef>
-                <a:spcPts val="500"/>
-              </a:spcBef>
-              <a:buSzPct val="125000"/>
-              <a:buFont typeface="Arial" panose="020B0604020202020204" pitchFamily="34" charset="0"/>
-              <a:buChar char="•"/>
-              <a:defRPr sz="1800" kern="1200">
-                <a:solidFill>
-                  <a:schemeClr val="tx1"/>
-                </a:solidFill>
-                <a:latin typeface="+mn-lt"/>
-                <a:ea typeface="+mn-ea"/>
-                <a:cs typeface="+mn-cs"/>
-              </a:defRPr>
-            </a:lvl3pPr>
-            <a:lvl4pPr marL="1600200" indent="-228600" algn="l" defTabSz="914400" rtl="0" eaLnBrk="1" latinLnBrk="0" hangingPunct="1">
-              <a:lnSpc>
-                <a:spcPct val="120000"/>
-              </a:lnSpc>
-              <a:spcBef>
-                <a:spcPts val="500"/>
-              </a:spcBef>
-              <a:buSzPct val="125000"/>
-              <a:buFont typeface="Arial" panose="020B0604020202020204" pitchFamily="34" charset="0"/>
-              <a:buChar char="•"/>
-              <a:defRPr sz="1600" kern="1200">
-                <a:solidFill>
-                  <a:schemeClr val="tx1"/>
-                </a:solidFill>
-                <a:latin typeface="+mn-lt"/>
-                <a:ea typeface="+mn-ea"/>
-                <a:cs typeface="+mn-cs"/>
-              </a:defRPr>
-            </a:lvl4pPr>
-            <a:lvl5pPr marL="2057400" indent="-228600" algn="l" defTabSz="914400" rtl="0" eaLnBrk="1" latinLnBrk="0" hangingPunct="1">
-              <a:lnSpc>
-                <a:spcPct val="120000"/>
-              </a:lnSpc>
-              <a:spcBef>
-                <a:spcPts val="500"/>
-              </a:spcBef>
-              <a:buSzPct val="125000"/>
-              <a:buFont typeface="Arial" panose="020B0604020202020204" pitchFamily="34" charset="0"/>
-              <a:buChar char="•"/>
-              <a:defRPr sz="1600" kern="1200">
-                <a:solidFill>
-                  <a:schemeClr val="tx1"/>
-                </a:solidFill>
-                <a:latin typeface="+mn-lt"/>
-                <a:ea typeface="+mn-ea"/>
-                <a:cs typeface="+mn-cs"/>
-              </a:defRPr>
-            </a:lvl5pPr>
-            <a:lvl6pPr marL="2514600" indent="-228600" algn="l" defTabSz="914400" rtl="0" eaLnBrk="1" latinLnBrk="0" hangingPunct="1">
-              <a:lnSpc>
-                <a:spcPct val="120000"/>
-              </a:lnSpc>
-              <a:spcBef>
-                <a:spcPts val="500"/>
-              </a:spcBef>
-              <a:buSzPct val="125000"/>
-              <a:buFont typeface="Arial" panose="020B0604020202020204" pitchFamily="34" charset="0"/>
-              <a:buChar char="•"/>
-              <a:defRPr sz="1400" kern="1200">
-                <a:solidFill>
-                  <a:schemeClr val="tx1"/>
-                </a:solidFill>
-                <a:latin typeface="+mn-lt"/>
-                <a:ea typeface="+mn-ea"/>
-                <a:cs typeface="+mn-cs"/>
-              </a:defRPr>
-            </a:lvl6pPr>
-            <a:lvl7pPr marL="2971800" indent="-228600" algn="l" defTabSz="914400" rtl="0" eaLnBrk="1" latinLnBrk="0" hangingPunct="1">
-              <a:lnSpc>
-                <a:spcPct val="120000"/>
-              </a:lnSpc>
-              <a:spcBef>
-                <a:spcPts val="500"/>
-              </a:spcBef>
-              <a:buSzPct val="125000"/>
-              <a:buFont typeface="Arial" panose="020B0604020202020204" pitchFamily="34" charset="0"/>
-              <a:buChar char="•"/>
-              <a:defRPr sz="1400" kern="1200">
-                <a:solidFill>
-                  <a:schemeClr val="tx1"/>
-                </a:solidFill>
-                <a:latin typeface="+mn-lt"/>
-                <a:ea typeface="+mn-ea"/>
-                <a:cs typeface="+mn-cs"/>
-              </a:defRPr>
-            </a:lvl7pPr>
-            <a:lvl8pPr marL="3429000" indent="-228600" algn="l" defTabSz="914400" rtl="0" eaLnBrk="1" latinLnBrk="0" hangingPunct="1">
-              <a:lnSpc>
-                <a:spcPct val="120000"/>
-              </a:lnSpc>
-              <a:spcBef>
-                <a:spcPts val="500"/>
-              </a:spcBef>
-              <a:buSzPct val="125000"/>
-              <a:buFont typeface="Arial" panose="020B0604020202020204" pitchFamily="34" charset="0"/>
-              <a:buChar char="•"/>
-              <a:defRPr sz="1400" kern="1200">
-                <a:solidFill>
-                  <a:schemeClr val="tx1"/>
-                </a:solidFill>
-                <a:latin typeface="+mn-lt"/>
-                <a:ea typeface="+mn-ea"/>
-                <a:cs typeface="+mn-cs"/>
-              </a:defRPr>
-            </a:lvl8pPr>
-            <a:lvl9pPr marL="3886200" indent="-228600" algn="l" defTabSz="914400" rtl="0" eaLnBrk="1" latinLnBrk="0" hangingPunct="1">
-              <a:lnSpc>
-                <a:spcPct val="120000"/>
-              </a:lnSpc>
-              <a:spcBef>
-                <a:spcPts val="500"/>
-              </a:spcBef>
-              <a:buSzPct val="125000"/>
-              <a:buFont typeface="Arial" panose="020B0604020202020204" pitchFamily="34" charset="0"/>
-              <a:buChar char="•"/>
-              <a:defRPr sz="1400" kern="1200">
-                <a:solidFill>
-                  <a:schemeClr val="tx1"/>
-                </a:solidFill>
-                <a:latin typeface="+mn-lt"/>
-                <a:ea typeface="+mn-ea"/>
-                <a:cs typeface="+mn-cs"/>
-              </a:defRPr>
-            </a:lvl9pPr>
-          </a:lstStyle>
-          <a:p>
-            <a:r>
-              <a:rPr lang="en-US"/>
-              <a:t>Yes, you are guinea pigs.</a:t>
-            </a:r>
-          </a:p>
-          <a:p>
-            <a:r>
-              <a:rPr lang="en-US"/>
-              <a:t>Please let me know if things are going too fast/slow.</a:t>
-            </a:r>
-          </a:p>
-          <a:p>
-            <a:r>
-              <a:rPr lang="en-US"/>
-              <a:t>Greatly appreciate your feed back at the end of class.</a:t>
-            </a:r>
-            <a:endParaRPr lang="en-US" dirty="0"/>
-          </a:p>
-        </p:txBody>
-      </p:sp>
-    </p:spTree>
-    <p:extLst>
-      <p:ext uri="{BB962C8B-B14F-4D97-AF65-F5344CB8AC3E}">
-        <p14:creationId xmlns:p14="http://schemas.microsoft.com/office/powerpoint/2010/main" val="2903770166"/>
-      </p:ext>
-    </p:extLst>
-  </p:cSld>
-  <p:clrMapOvr>
-    <a:masterClrMapping/>
-  </p:clrMapOvr>
-</p:sld>
-</file>
-
-<file path=ppt/slides/slide30.xml><?xml version="1.0" encoding="utf-8"?>
+<file path=ppt/slides/slide29.xml><?xml version="1.0" encoding="utf-8"?>
 <p:sld xmlns:a="http://schemas.openxmlformats.org/drawingml/2006/main" xmlns:r="http://schemas.openxmlformats.org/officeDocument/2006/relationships" xmlns:p="http://schemas.openxmlformats.org/presentationml/2006/main">
   <p:cSld>
     <p:spTree>
@@ -35117,7 +34638,7 @@
             </a:r>
             <a:r>
               <a:rPr lang="en-US" dirty="0" err="1"/>
-              <a:t>IoTWebConfig</a:t>
+              <a:t>IoTWebConf</a:t>
             </a:r>
             <a:endParaRPr lang="en-US" dirty="0"/>
           </a:p>
@@ -35127,12 +34648,12 @@
               <a:t>Install the </a:t>
             </a:r>
             <a:r>
-              <a:rPr lang="en-US" dirty="0" err="1"/>
-              <a:t>IoTWebConfig</a:t>
+              <a:rPr lang="en-US"/>
+              <a:t>IoTWebConf </a:t>
             </a:r>
             <a:r>
               <a:rPr lang="en-US" dirty="0"/>
-              <a:t> library</a:t>
+              <a:t>library</a:t>
             </a:r>
           </a:p>
         </p:txBody>
@@ -35150,7 +34671,117 @@
 </p:sld>
 </file>
 
-<file path=ppt/slides/slide31.xml><?xml version="1.0" encoding="utf-8"?>
+<file path=ppt/slides/slide3.xml><?xml version="1.0" encoding="utf-8"?>
+<p:sld xmlns:a="http://schemas.openxmlformats.org/drawingml/2006/main" xmlns:r="http://schemas.openxmlformats.org/officeDocument/2006/relationships" xmlns:p="http://schemas.openxmlformats.org/presentationml/2006/main">
+  <p:cSld>
+    <p:spTree>
+      <p:nvGrpSpPr>
+        <p:cNvPr id="1" name=""/>
+        <p:cNvGrpSpPr/>
+        <p:nvPr/>
+      </p:nvGrpSpPr>
+      <p:grpSpPr>
+        <a:xfrm>
+          <a:off x="0" y="0"/>
+          <a:ext cx="0" cy="0"/>
+          <a:chOff x="0" y="0"/>
+          <a:chExt cx="0" cy="0"/>
+        </a:xfrm>
+      </p:grpSpPr>
+      <p:sp>
+        <p:nvSpPr>
+          <p:cNvPr id="2" name="Title 1">
+            <a:extLst>
+              <a:ext uri="{FF2B5EF4-FFF2-40B4-BE49-F238E27FC236}">
+                <a16:creationId xmlns:a16="http://schemas.microsoft.com/office/drawing/2014/main" id="{92C8E133-5EE0-43BD-B12B-7170777333D1}"/>
+              </a:ext>
+            </a:extLst>
+          </p:cNvPr>
+          <p:cNvSpPr>
+            <a:spLocks noGrp="1"/>
+          </p:cNvSpPr>
+          <p:nvPr>
+            <p:ph type="title"/>
+          </p:nvPr>
+        </p:nvSpPr>
+        <p:spPr/>
+        <p:txBody>
+          <a:bodyPr/>
+          <a:lstStyle/>
+          <a:p>
+            <a:r>
+              <a:rPr lang="en-US" dirty="0"/>
+              <a:t>Class Outline</a:t>
+            </a:r>
+          </a:p>
+        </p:txBody>
+      </p:sp>
+      <p:sp>
+        <p:nvSpPr>
+          <p:cNvPr id="3" name="Content Placeholder 2">
+            <a:extLst>
+              <a:ext uri="{FF2B5EF4-FFF2-40B4-BE49-F238E27FC236}">
+                <a16:creationId xmlns:a16="http://schemas.microsoft.com/office/drawing/2014/main" id="{87F65294-609C-4B9F-94B1-2F2A0590E602}"/>
+              </a:ext>
+            </a:extLst>
+          </p:cNvPr>
+          <p:cNvSpPr>
+            <a:spLocks noGrp="1"/>
+          </p:cNvSpPr>
+          <p:nvPr>
+            <p:ph idx="1"/>
+          </p:nvPr>
+        </p:nvSpPr>
+        <p:spPr/>
+        <p:txBody>
+          <a:bodyPr/>
+          <a:lstStyle/>
+          <a:p>
+            <a:r>
+              <a:rPr lang="en-US" dirty="0"/>
+              <a:t>Arduino Installation</a:t>
+            </a:r>
+          </a:p>
+          <a:p>
+            <a:r>
+              <a:rPr lang="en-US" dirty="0"/>
+              <a:t>Hardware Overview</a:t>
+            </a:r>
+          </a:p>
+          <a:p>
+            <a:r>
+              <a:rPr lang="en-US" dirty="0"/>
+              <a:t>Circuit Building</a:t>
+            </a:r>
+          </a:p>
+          <a:p>
+            <a:r>
+              <a:rPr lang="en-US" dirty="0"/>
+              <a:t>Code</a:t>
+            </a:r>
+          </a:p>
+          <a:p>
+            <a:r>
+              <a:rPr lang="en-US" dirty="0"/>
+              <a:t>Debug</a:t>
+            </a:r>
+          </a:p>
+        </p:txBody>
+      </p:sp>
+    </p:spTree>
+    <p:extLst>
+      <p:ext uri="{BB962C8B-B14F-4D97-AF65-F5344CB8AC3E}">
+        <p14:creationId xmlns:p14="http://schemas.microsoft.com/office/powerpoint/2010/main" val="2160162556"/>
+      </p:ext>
+    </p:extLst>
+  </p:cSld>
+  <p:clrMapOvr>
+    <a:masterClrMapping/>
+  </p:clrMapOvr>
+</p:sld>
+</file>
+
+<file path=ppt/slides/slide30.xml><?xml version="1.0" encoding="utf-8"?>
 <p:sld xmlns:a="http://schemas.openxmlformats.org/drawingml/2006/main" xmlns:r="http://schemas.openxmlformats.org/officeDocument/2006/relationships" xmlns:p="http://schemas.openxmlformats.org/presentationml/2006/main">
   <p:cSld>
     <p:spTree>
@@ -35290,7 +34921,7 @@
 </p:sld>
 </file>
 
-<file path=ppt/slides/slide32.xml><?xml version="1.0" encoding="utf-8"?>
+<file path=ppt/slides/slide31.xml><?xml version="1.0" encoding="utf-8"?>
 <p:sld xmlns:a="http://schemas.openxmlformats.org/drawingml/2006/main" xmlns:r="http://schemas.openxmlformats.org/officeDocument/2006/relationships" xmlns:p="http://schemas.openxmlformats.org/presentationml/2006/main">
   <p:cSld>
     <p:spTree>
@@ -35399,7 +35030,7 @@
 </p:sld>
 </file>
 
-<file path=ppt/slides/slide33.xml><?xml version="1.0" encoding="utf-8"?>
+<file path=ppt/slides/slide32.xml><?xml version="1.0" encoding="utf-8"?>
 <p:sld xmlns:a="http://schemas.openxmlformats.org/drawingml/2006/main" xmlns:r="http://schemas.openxmlformats.org/officeDocument/2006/relationships" xmlns:p="http://schemas.openxmlformats.org/presentationml/2006/main">
   <p:cSld>
     <p:spTree>
@@ -35502,7 +35133,7 @@
 </p:sld>
 </file>
 
-<file path=ppt/slides/slide34.xml><?xml version="1.0" encoding="utf-8"?>
+<file path=ppt/slides/slide33.xml><?xml version="1.0" encoding="utf-8"?>
 <p:sld xmlns:a="http://schemas.openxmlformats.org/drawingml/2006/main" xmlns:r="http://schemas.openxmlformats.org/officeDocument/2006/relationships" xmlns:p="http://schemas.openxmlformats.org/presentationml/2006/main">
   <p:cSld>
     <p:spTree>
@@ -35645,7 +35276,7 @@
 </p:sld>
 </file>
 
-<file path=ppt/slides/slide35.xml><?xml version="1.0" encoding="utf-8"?>
+<file path=ppt/slides/slide34.xml><?xml version="1.0" encoding="utf-8"?>
 <p:sld xmlns:a="http://schemas.openxmlformats.org/drawingml/2006/main" xmlns:r="http://schemas.openxmlformats.org/officeDocument/2006/relationships" xmlns:p="http://schemas.openxmlformats.org/presentationml/2006/main">
   <p:cSld>
     <p:bg>
@@ -37895,116 +37526,6 @@
           <p:cNvPr id="2" name="Title 1">
             <a:extLst>
               <a:ext uri="{FF2B5EF4-FFF2-40B4-BE49-F238E27FC236}">
-                <a16:creationId xmlns:a16="http://schemas.microsoft.com/office/drawing/2014/main" id="{92C8E133-5EE0-43BD-B12B-7170777333D1}"/>
-              </a:ext>
-            </a:extLst>
-          </p:cNvPr>
-          <p:cNvSpPr>
-            <a:spLocks noGrp="1"/>
-          </p:cNvSpPr>
-          <p:nvPr>
-            <p:ph type="title"/>
-          </p:nvPr>
-        </p:nvSpPr>
-        <p:spPr/>
-        <p:txBody>
-          <a:bodyPr/>
-          <a:lstStyle/>
-          <a:p>
-            <a:r>
-              <a:rPr lang="en-US" dirty="0"/>
-              <a:t>Class Outline</a:t>
-            </a:r>
-          </a:p>
-        </p:txBody>
-      </p:sp>
-      <p:sp>
-        <p:nvSpPr>
-          <p:cNvPr id="3" name="Content Placeholder 2">
-            <a:extLst>
-              <a:ext uri="{FF2B5EF4-FFF2-40B4-BE49-F238E27FC236}">
-                <a16:creationId xmlns:a16="http://schemas.microsoft.com/office/drawing/2014/main" id="{87F65294-609C-4B9F-94B1-2F2A0590E602}"/>
-              </a:ext>
-            </a:extLst>
-          </p:cNvPr>
-          <p:cNvSpPr>
-            <a:spLocks noGrp="1"/>
-          </p:cNvSpPr>
-          <p:nvPr>
-            <p:ph idx="1"/>
-          </p:nvPr>
-        </p:nvSpPr>
-        <p:spPr/>
-        <p:txBody>
-          <a:bodyPr/>
-          <a:lstStyle/>
-          <a:p>
-            <a:r>
-              <a:rPr lang="en-US" dirty="0"/>
-              <a:t>Arduino Installation</a:t>
-            </a:r>
-          </a:p>
-          <a:p>
-            <a:r>
-              <a:rPr lang="en-US" dirty="0"/>
-              <a:t>Hardware Overview</a:t>
-            </a:r>
-          </a:p>
-          <a:p>
-            <a:r>
-              <a:rPr lang="en-US" dirty="0"/>
-              <a:t>Circuit Building</a:t>
-            </a:r>
-          </a:p>
-          <a:p>
-            <a:r>
-              <a:rPr lang="en-US" dirty="0"/>
-              <a:t>Code</a:t>
-            </a:r>
-          </a:p>
-          <a:p>
-            <a:r>
-              <a:rPr lang="en-US" dirty="0"/>
-              <a:t>Debug</a:t>
-            </a:r>
-          </a:p>
-        </p:txBody>
-      </p:sp>
-    </p:spTree>
-    <p:extLst>
-      <p:ext uri="{BB962C8B-B14F-4D97-AF65-F5344CB8AC3E}">
-        <p14:creationId xmlns:p14="http://schemas.microsoft.com/office/powerpoint/2010/main" val="2160162556"/>
-      </p:ext>
-    </p:extLst>
-  </p:cSld>
-  <p:clrMapOvr>
-    <a:masterClrMapping/>
-  </p:clrMapOvr>
-</p:sld>
-</file>
-
-<file path=ppt/slides/slide5.xml><?xml version="1.0" encoding="utf-8"?>
-<p:sld xmlns:a="http://schemas.openxmlformats.org/drawingml/2006/main" xmlns:r="http://schemas.openxmlformats.org/officeDocument/2006/relationships" xmlns:p="http://schemas.openxmlformats.org/presentationml/2006/main">
-  <p:cSld>
-    <p:spTree>
-      <p:nvGrpSpPr>
-        <p:cNvPr id="1" name=""/>
-        <p:cNvGrpSpPr/>
-        <p:nvPr/>
-      </p:nvGrpSpPr>
-      <p:grpSpPr>
-        <a:xfrm>
-          <a:off x="0" y="0"/>
-          <a:ext cx="0" cy="0"/>
-          <a:chOff x="0" y="0"/>
-          <a:chExt cx="0" cy="0"/>
-        </a:xfrm>
-      </p:grpSpPr>
-      <p:sp>
-        <p:nvSpPr>
-          <p:cNvPr id="2" name="Title 1">
-            <a:extLst>
-              <a:ext uri="{FF2B5EF4-FFF2-40B4-BE49-F238E27FC236}">
                 <a16:creationId xmlns:a16="http://schemas.microsoft.com/office/drawing/2014/main" id="{A7EC9454-55D0-4FBB-A477-D49B2858392D}"/>
               </a:ext>
             </a:extLst>
@@ -38106,7 +37627,7 @@
 </p:sld>
 </file>
 
-<file path=ppt/slides/slide6.xml><?xml version="1.0" encoding="utf-8"?>
+<file path=ppt/slides/slide5.xml><?xml version="1.0" encoding="utf-8"?>
 <p:sld xmlns:a="http://schemas.openxmlformats.org/drawingml/2006/main" xmlns:r="http://schemas.openxmlformats.org/officeDocument/2006/relationships" xmlns:p="http://schemas.openxmlformats.org/presentationml/2006/main">
   <p:cSld>
     <p:spTree>
@@ -38248,7 +37769,7 @@
 </p:sld>
 </file>
 
-<file path=ppt/slides/slide7.xml><?xml version="1.0" encoding="utf-8"?>
+<file path=ppt/slides/slide6.xml><?xml version="1.0" encoding="utf-8"?>
 <p:sld xmlns:a="http://schemas.openxmlformats.org/drawingml/2006/main" xmlns:r="http://schemas.openxmlformats.org/officeDocument/2006/relationships" xmlns:p="http://schemas.openxmlformats.org/presentationml/2006/main">
   <p:cSld>
     <p:spTree>
@@ -38376,7 +37897,7 @@
 </p:sld>
 </file>
 
-<file path=ppt/slides/slide8.xml><?xml version="1.0" encoding="utf-8"?>
+<file path=ppt/slides/slide7.xml><?xml version="1.0" encoding="utf-8"?>
 <p:sld xmlns:a="http://schemas.openxmlformats.org/drawingml/2006/main" xmlns:r="http://schemas.openxmlformats.org/officeDocument/2006/relationships" xmlns:p="http://schemas.openxmlformats.org/presentationml/2006/main">
   <p:cSld>
     <p:spTree>
@@ -38700,6 +38221,130 @@
     <p:extLst>
       <p:ext uri="{BB962C8B-B14F-4D97-AF65-F5344CB8AC3E}">
         <p14:creationId xmlns:p14="http://schemas.microsoft.com/office/powerpoint/2010/main" val="919406652"/>
+      </p:ext>
+    </p:extLst>
+  </p:cSld>
+  <p:clrMapOvr>
+    <a:masterClrMapping/>
+  </p:clrMapOvr>
+</p:sld>
+</file>
+
+<file path=ppt/slides/slide8.xml><?xml version="1.0" encoding="utf-8"?>
+<p:sld xmlns:a="http://schemas.openxmlformats.org/drawingml/2006/main" xmlns:r="http://schemas.openxmlformats.org/officeDocument/2006/relationships" xmlns:p="http://schemas.openxmlformats.org/presentationml/2006/main">
+  <p:cSld>
+    <p:spTree>
+      <p:nvGrpSpPr>
+        <p:cNvPr id="1" name=""/>
+        <p:cNvGrpSpPr/>
+        <p:nvPr/>
+      </p:nvGrpSpPr>
+      <p:grpSpPr>
+        <a:xfrm>
+          <a:off x="0" y="0"/>
+          <a:ext cx="0" cy="0"/>
+          <a:chOff x="0" y="0"/>
+          <a:chExt cx="0" cy="0"/>
+        </a:xfrm>
+      </p:grpSpPr>
+      <p:pic>
+        <p:nvPicPr>
+          <p:cNvPr id="5" name="Picture 4"/>
+          <p:cNvPicPr>
+            <a:picLocks noChangeAspect="1"/>
+          </p:cNvPicPr>
+          <p:nvPr/>
+        </p:nvPicPr>
+        <p:blipFill>
+          <a:blip r:embed="rId2"/>
+          <a:stretch>
+            <a:fillRect/>
+          </a:stretch>
+        </p:blipFill>
+        <p:spPr>
+          <a:xfrm>
+            <a:off x="873392" y="951722"/>
+            <a:ext cx="5139294" cy="4946570"/>
+          </a:xfrm>
+          <a:prstGeom prst="rect">
+            <a:avLst/>
+          </a:prstGeom>
+        </p:spPr>
+      </p:pic>
+      <p:sp>
+        <p:nvSpPr>
+          <p:cNvPr id="2" name="Title 1"/>
+          <p:cNvSpPr>
+            <a:spLocks noGrp="1"/>
+          </p:cNvSpPr>
+          <p:nvPr>
+            <p:ph type="title"/>
+          </p:nvPr>
+        </p:nvSpPr>
+        <p:spPr>
+          <a:xfrm>
+            <a:off x="6569957" y="618518"/>
+            <a:ext cx="4747088" cy="1478570"/>
+          </a:xfrm>
+        </p:spPr>
+        <p:txBody>
+          <a:bodyPr>
+            <a:normAutofit/>
+          </a:bodyPr>
+          <a:lstStyle/>
+          <a:p>
+            <a:r>
+              <a:rPr lang="en-US" dirty="0"/>
+              <a:t>The Breadboard</a:t>
+            </a:r>
+          </a:p>
+        </p:txBody>
+      </p:sp>
+      <p:sp>
+        <p:nvSpPr>
+          <p:cNvPr id="3" name="Content Placeholder 2"/>
+          <p:cNvSpPr>
+            <a:spLocks noGrp="1"/>
+          </p:cNvSpPr>
+          <p:nvPr>
+            <p:ph idx="1"/>
+          </p:nvPr>
+        </p:nvSpPr>
+        <p:spPr>
+          <a:xfrm>
+            <a:off x="6569957" y="2249487"/>
+            <a:ext cx="4747087" cy="3541714"/>
+          </a:xfrm>
+        </p:spPr>
+        <p:txBody>
+          <a:bodyPr>
+            <a:normAutofit/>
+          </a:bodyPr>
+          <a:lstStyle/>
+          <a:p>
+            <a:r>
+              <a:rPr lang="en-US" dirty="0"/>
+              <a:t>The power lines, 2 on each edge, run vertically</a:t>
+            </a:r>
+          </a:p>
+          <a:p>
+            <a:r>
+              <a:rPr lang="en-US" dirty="0"/>
+              <a:t>The prototyping lines run horizontally</a:t>
+            </a:r>
+          </a:p>
+          <a:p>
+            <a:r>
+              <a:rPr lang="en-US" dirty="0"/>
+              <a:t>No lines cross the center gap</a:t>
+            </a:r>
+          </a:p>
+        </p:txBody>
+      </p:sp>
+    </p:spTree>
+    <p:extLst>
+      <p:ext uri="{BB962C8B-B14F-4D97-AF65-F5344CB8AC3E}">
+        <p14:creationId xmlns:p14="http://schemas.microsoft.com/office/powerpoint/2010/main" val="2671499571"/>
       </p:ext>
     </p:extLst>
   </p:cSld>

</xml_diff>